<commit_message>
updated slides, remove extra slides, remove extra icon
</commit_message>
<xml_diff>
--- a/Session_6_Spring_Security.pptx
+++ b/Session_6_Spring_Security.pptx
@@ -4563,7 +4563,7 @@
         </p:nvSpPr>
         <p:spPr>
           <a:xfrm>
-            <a:off x="457199" y="1108075"/>
+            <a:off x="457199" y="1341754"/>
             <a:ext cx="8453121" cy="1381126"/>
           </a:xfrm>
         </p:spPr>
@@ -4580,30 +4580,6 @@
               <a:rPr lang="en-US" sz="1400" dirty="0" smtClean="0"/>
               <a:t>a framework that focuses on providing both authentication and authorization to Java and Groovy applications</a:t>
             </a:r>
-          </a:p>
-          <a:p>
-            <a:pPr marL="0" indent="0">
-              <a:buNone/>
-            </a:pPr>
-            <a:endParaRPr lang="en-US" sz="1400" dirty="0"/>
-          </a:p>
-          <a:p>
-            <a:pPr marL="0" indent="0">
-              <a:buNone/>
-            </a:pPr>
-            <a:r>
-              <a:rPr lang="en-US" sz="1400" dirty="0" smtClean="0"/>
-              <a:t>It makes it </a:t>
-            </a:r>
-            <a:r>
-              <a:rPr lang="en-US" sz="1400" i="1" u="sng" dirty="0" smtClean="0"/>
-              <a:t>easy to use </a:t>
-            </a:r>
-            <a:r>
-              <a:rPr lang="en-US" sz="1400" dirty="0" smtClean="0"/>
-              <a:t>data access technologies, relational and non-relational databases, map-reduce frameworks, and cloud-based data services.</a:t>
-            </a:r>
-            <a:endParaRPr lang="en-US" sz="1400" dirty="0" smtClean="0"/>
           </a:p>
         </p:txBody>
       </p:sp>
@@ -6727,7 +6703,7 @@
           <a:p>
             <a:r>
               <a:rPr lang="en-US" dirty="0" smtClean="0"/>
-              <a:t>Spring Data JPA</a:t>
+              <a:t>Spring Security</a:t>
             </a:r>
             <a:endParaRPr lang="en-US" dirty="0">
               <a:solidFill>
@@ -7012,7 +6988,7 @@
         </p:blipFill>
         <p:spPr>
           <a:xfrm>
-            <a:off x="3474720" y="3218274"/>
+            <a:off x="3129280" y="3174870"/>
             <a:ext cx="4683760" cy="1673523"/>
           </a:xfrm>
           <a:prstGeom prst="rect">
@@ -8161,7 +8137,7 @@
         <p:spPr>
           <a:xfrm>
             <a:off x="243840" y="2916554"/>
-            <a:ext cx="2672081" cy="629285"/>
+            <a:ext cx="2672081" cy="995046"/>
           </a:xfrm>
           <a:prstGeom prst="rect">
             <a:avLst/>
@@ -8315,7 +8291,7 @@
             </a:pPr>
             <a:r>
               <a:rPr lang="en-US" sz="1400" dirty="0" smtClean="0"/>
-              <a:t>We can use generate </a:t>
+              <a:t>We can use generated </a:t>
             </a:r>
           </a:p>
           <a:p>
@@ -8329,7 +8305,21 @@
             </a:r>
             <a:r>
               <a:rPr lang="en-US" sz="1400" dirty="0" smtClean="0"/>
-              <a:t> and secrets </a:t>
+              <a:t> and secrets to</a:t>
+            </a:r>
+          </a:p>
+          <a:p>
+            <a:pPr marL="0" indent="0">
+              <a:buFont typeface="Arial"/>
+              <a:buNone/>
+            </a:pPr>
+            <a:r>
+              <a:rPr lang="en-US" sz="1400" dirty="0"/>
+              <a:t>r</a:t>
+            </a:r>
+            <a:r>
+              <a:rPr lang="en-US" sz="1400" dirty="0" smtClean="0"/>
+              <a:t>etrieve Bearer Token</a:t>
             </a:r>
             <a:endParaRPr lang="en-US" sz="1400" dirty="0" smtClean="0"/>
           </a:p>

</xml_diff>